<commit_message>
rad na draftu prezentacije
</commit_message>
<xml_diff>
--- a/PROGI_2023_Posterized_prezentacija.pptx
+++ b/PROGI_2023_Posterized_prezentacija.pptx
@@ -5802,8 +5802,8 @@
               </a:lnSpc>
             </a:pPr>
             <a:r>
-              <a:rPr lang="hr-HR" sz="2400" dirty="0"/>
-              <a:t>Ukratko iznesite osnovnu ideju, cilj i svrhu razvoja vašeg projekta</a:t>
+              <a:rPr lang="hr-HR" sz="2000" dirty="0"/>
+              <a:t>razvijanje web aplikacije za stručne konferencije</a:t>
             </a:r>
           </a:p>
           <a:p>
@@ -5813,20 +5813,63 @@
               </a:lnSpc>
             </a:pPr>
             <a:r>
-              <a:rPr lang="hr-HR" sz="2400" dirty="0"/>
-              <a:t>Postoji li na tržištu sličan programski proizvod?</a:t>
-            </a:r>
-          </a:p>
-          <a:p>
-            <a:pPr lvl="1">
+              <a:rPr lang="hr-HR" sz="2000" dirty="0"/>
+              <a:t>mogućnost pregledavanja i glasanja za radove u realnom vremenu</a:t>
+            </a:r>
+          </a:p>
+          <a:p>
+            <a:pPr>
               <a:lnSpc>
                 <a:spcPct val="100000"/>
               </a:lnSpc>
             </a:pPr>
             <a:r>
               <a:rPr lang="hr-HR" sz="2000" dirty="0"/>
-              <a:t>Usporedite značajke</a:t>
-            </a:r>
+              <a:t>intuitivno korisničko iskustvo prilagođeno potrebama sudionika konferencija</a:t>
+            </a:r>
+          </a:p>
+          <a:p>
+            <a:pPr>
+              <a:lnSpc>
+                <a:spcPct val="100000"/>
+              </a:lnSpc>
+            </a:pPr>
+            <a:r>
+              <a:rPr lang="hr-HR" sz="2000" dirty="0"/>
+              <a:t>integracija s umjetnom inteligencijom za personalizirane preporuke, društvene mreže, virtualne stvarnosti za obilazak dvorane,…</a:t>
+            </a:r>
+          </a:p>
+          <a:p>
+            <a:pPr>
+              <a:lnSpc>
+                <a:spcPct val="100000"/>
+              </a:lnSpc>
+            </a:pPr>
+            <a:r>
+              <a:rPr lang="hr-HR" sz="2000" dirty="0"/>
+              <a:t>slične platforme su </a:t>
+            </a:r>
+            <a:r>
+              <a:rPr lang="hr-HR" sz="2000" dirty="0" err="1"/>
+              <a:t>Whova</a:t>
+            </a:r>
+            <a:r>
+              <a:rPr lang="hr-HR" sz="2000" dirty="0"/>
+              <a:t>, </a:t>
+            </a:r>
+            <a:r>
+              <a:rPr lang="hr-HR" sz="2000" dirty="0" err="1"/>
+              <a:t>EventMobi</a:t>
+            </a:r>
+            <a:r>
+              <a:rPr lang="hr-HR" sz="2000" dirty="0"/>
+              <a:t> i </a:t>
+            </a:r>
+            <a:r>
+              <a:rPr lang="hr-HR" sz="2000" dirty="0" err="1"/>
+              <a:t>Attendify</a:t>
+            </a:r>
+            <a:endParaRPr lang="hr-HR" sz="2000" dirty="0"/>
           </a:p>
         </p:txBody>
       </p:sp>
@@ -6147,7 +6190,74 @@
                 <a:spcPct val="100000"/>
               </a:lnSpc>
             </a:pPr>
+            <a:r>
+              <a:rPr lang="hr-HR" sz="2400" dirty="0"/>
+              <a:t>istovremeni rad više korisnika</a:t>
+            </a:r>
+          </a:p>
+          <a:p>
+            <a:pPr>
+              <a:lnSpc>
+                <a:spcPct val="100000"/>
+              </a:lnSpc>
+            </a:pPr>
+            <a:r>
+              <a:rPr lang="hr-HR" sz="2400" dirty="0" err="1"/>
+              <a:t>responzivan</a:t>
+            </a:r>
+            <a:r>
+              <a:rPr lang="hr-HR" sz="2400" dirty="0"/>
+              <a:t> dizajn</a:t>
+            </a:r>
+          </a:p>
+          <a:p>
+            <a:pPr>
+              <a:lnSpc>
+                <a:spcPct val="100000"/>
+              </a:lnSpc>
+            </a:pPr>
+            <a:r>
+              <a:rPr lang="hr-HR" sz="2400" dirty="0"/>
+              <a:t>brz pristup bazi podataka</a:t>
+            </a:r>
+          </a:p>
+          <a:p>
+            <a:pPr>
+              <a:lnSpc>
+                <a:spcPct val="100000"/>
+              </a:lnSpc>
+            </a:pPr>
+            <a:r>
+              <a:rPr lang="hr-HR" sz="2400" dirty="0"/>
+              <a:t>web aplikacija, objektno orijentirani jezici, </a:t>
+            </a:r>
+            <a:r>
+              <a:rPr lang="hr-HR" sz="2400" dirty="0" err="1"/>
+              <a:t>polimorfizam</a:t>
+            </a:r>
             <a:endParaRPr lang="hr-HR" sz="2400" dirty="0"/>
+          </a:p>
+          <a:p>
+            <a:pPr>
+              <a:lnSpc>
+                <a:spcPct val="100000"/>
+              </a:lnSpc>
+            </a:pPr>
+            <a:r>
+              <a:rPr lang="hr-HR" sz="2400" dirty="0"/>
+              <a:t>stabilnost pri neispravnom korištenju</a:t>
+            </a:r>
+          </a:p>
+          <a:p>
+            <a:pPr>
+              <a:lnSpc>
+                <a:spcPct val="100000"/>
+              </a:lnSpc>
+            </a:pPr>
+            <a:r>
+              <a:rPr lang="hr-HR" sz="2400" dirty="0"/>
+              <a:t>intuitivno i jednostavno grafičko sučelje</a:t>
+            </a:r>
           </a:p>
         </p:txBody>
       </p:sp>

</xml_diff>

<commit_message>
jos samo arhitektura sustava
</commit_message>
<xml_diff>
--- a/PROGI_2023_Posterized_prezentacija.pptx
+++ b/PROGI_2023_Posterized_prezentacija.pptx
@@ -5120,31 +5120,105 @@
           <a:bodyPr/>
           <a:lstStyle/>
           <a:p>
-            <a:r>
-              <a:rPr lang="hr-HR" dirty="0"/>
-              <a:t>Što je bilo dobro, a što je moglo bolje</a:t>
-            </a:r>
-          </a:p>
-          <a:p>
-            <a:pPr lvl="1"/>
-            <a:r>
-              <a:rPr lang="hr-HR" dirty="0"/>
-              <a:t>A što se nikako ne bi smjelo ponoviti </a:t>
-            </a:r>
-            <a:r>
-              <a:rPr lang="hr-HR" dirty="0">
+            <a:pPr lvl="1">
+              <a:lnSpc>
+                <a:spcPct val="150000"/>
+              </a:lnSpc>
+            </a:pPr>
+            <a:r>
+              <a:rPr lang="hr-HR" sz="2400" dirty="0">
                 <a:sym typeface="Wingdings" panose="05000000000000000000" pitchFamily="2" charset="2"/>
               </a:rPr>
-              <a:t></a:t>
+              <a:t>naučene nove tehnologije u procesu razvoja softvera</a:t>
+            </a:r>
+          </a:p>
+          <a:p>
+            <a:pPr lvl="1">
+              <a:lnSpc>
+                <a:spcPct val="150000"/>
+              </a:lnSpc>
+            </a:pPr>
+            <a:r>
+              <a:rPr lang="hr-HR" sz="2400" dirty="0">
+                <a:sym typeface="Wingdings" panose="05000000000000000000" pitchFamily="2" charset="2"/>
+              </a:rPr>
+              <a:t>podjela na </a:t>
+            </a:r>
+            <a:r>
+              <a:rPr lang="hr-HR" sz="2400" dirty="0" err="1">
+                <a:sym typeface="Wingdings" panose="05000000000000000000" pitchFamily="2" charset="2"/>
+              </a:rPr>
+              <a:t>backend</a:t>
+            </a:r>
+            <a:r>
+              <a:rPr lang="hr-HR" sz="2400" dirty="0">
+                <a:sym typeface="Wingdings" panose="05000000000000000000" pitchFamily="2" charset="2"/>
+              </a:rPr>
+              <a:t> i </a:t>
+            </a:r>
+            <a:r>
+              <a:rPr lang="hr-HR" sz="2400" dirty="0" err="1">
+                <a:sym typeface="Wingdings" panose="05000000000000000000" pitchFamily="2" charset="2"/>
+              </a:rPr>
+              <a:t>frontend</a:t>
+            </a:r>
+            <a:r>
+              <a:rPr lang="hr-HR" sz="2400" dirty="0">
+                <a:sym typeface="Wingdings" panose="05000000000000000000" pitchFamily="2" charset="2"/>
+              </a:rPr>
+              <a:t> te uspješna suradnja</a:t>
+            </a:r>
+          </a:p>
+          <a:p>
+            <a:pPr lvl="1">
+              <a:lnSpc>
+                <a:spcPct val="150000"/>
+              </a:lnSpc>
+            </a:pPr>
+            <a:r>
+              <a:rPr lang="hr-HR" sz="2400" dirty="0"/>
+              <a:t>dokumentiranje uz proces razvoja</a:t>
+            </a:r>
+          </a:p>
+          <a:p>
+            <a:pPr lvl="1">
+              <a:lnSpc>
+                <a:spcPct val="150000"/>
+              </a:lnSpc>
+            </a:pPr>
+            <a:r>
+              <a:rPr lang="hr-HR" sz="2400" dirty="0"/>
+              <a:t>osjet timskog rada </a:t>
+            </a:r>
+          </a:p>
+          <a:p>
+            <a:pPr lvl="1">
+              <a:lnSpc>
+                <a:spcPct val="150000"/>
+              </a:lnSpc>
+            </a:pPr>
+            <a:r>
+              <a:rPr lang="hr-HR" sz="2400" dirty="0"/>
+              <a:t>kada nastane problem -&gt; konzultirati se s kolegama</a:t>
             </a:r>
           </a:p>
           <a:p>
             <a:pPr lvl="1"/>
-            <a:endParaRPr lang="hr-HR" dirty="0">
-              <a:sym typeface="Wingdings" panose="05000000000000000000" pitchFamily="2" charset="2"/>
-            </a:endParaRPr>
-          </a:p>
-          <a:p>
+            <a:endParaRPr lang="hr-HR" sz="2400" dirty="0"/>
+          </a:p>
+          <a:p>
+            <a:pPr lvl="1"/>
+            <a:r>
+              <a:rPr lang="hr-HR" sz="2400" b="1" dirty="0"/>
+              <a:t>najvažnija lekcija: </a:t>
+            </a:r>
+            <a:r>
+              <a:rPr lang="hr-HR" sz="2400" dirty="0"/>
+              <a:t>treba konzistentno raditi na komunikaciji</a:t>
+            </a:r>
+          </a:p>
+          <a:p>
+            <a:pPr lvl="1"/>
             <a:endParaRPr lang="hr-HR" dirty="0"/>
           </a:p>
         </p:txBody>

</xml_diff>